<commit_message>
correction de la taille des messages
</commit_message>
<xml_diff>
--- a/5_Project/Présentation.pptx
+++ b/5_Project/Présentation.pptx
@@ -9,6 +9,8 @@
     <p:sldId id="257" r:id="rId3"/>
     <p:sldId id="258" r:id="rId4"/>
     <p:sldId id="259" r:id="rId5"/>
+    <p:sldId id="260" r:id="rId6"/>
+    <p:sldId id="261" r:id="rId7"/>
   </p:sldIdLst>
   <p:sldSz cx="12192000" cy="6858000"/>
   <p:notesSz cx="6858000" cy="9144000"/>
@@ -264,7 +266,7 @@
           <a:p>
             <a:fld id="{46FC2CE2-C47C-4DDC-A391-1FD24B8ADB44}" type="datetimeFigureOut">
               <a:rPr lang="fr-CH" smtClean="0"/>
-              <a:t>23.05.2024</a:t>
+              <a:t>30.05.2024</a:t>
             </a:fld>
             <a:endParaRPr lang="fr-CH"/>
           </a:p>
@@ -464,7 +466,7 @@
           <a:p>
             <a:fld id="{46FC2CE2-C47C-4DDC-A391-1FD24B8ADB44}" type="datetimeFigureOut">
               <a:rPr lang="fr-CH" smtClean="0"/>
-              <a:t>23.05.2024</a:t>
+              <a:t>30.05.2024</a:t>
             </a:fld>
             <a:endParaRPr lang="fr-CH"/>
           </a:p>
@@ -674,7 +676,7 @@
           <a:p>
             <a:fld id="{46FC2CE2-C47C-4DDC-A391-1FD24B8ADB44}" type="datetimeFigureOut">
               <a:rPr lang="fr-CH" smtClean="0"/>
-              <a:t>23.05.2024</a:t>
+              <a:t>30.05.2024</a:t>
             </a:fld>
             <a:endParaRPr lang="fr-CH"/>
           </a:p>
@@ -874,7 +876,7 @@
           <a:p>
             <a:fld id="{46FC2CE2-C47C-4DDC-A391-1FD24B8ADB44}" type="datetimeFigureOut">
               <a:rPr lang="fr-CH" smtClean="0"/>
-              <a:t>23.05.2024</a:t>
+              <a:t>30.05.2024</a:t>
             </a:fld>
             <a:endParaRPr lang="fr-CH"/>
           </a:p>
@@ -1150,7 +1152,7 @@
           <a:p>
             <a:fld id="{46FC2CE2-C47C-4DDC-A391-1FD24B8ADB44}" type="datetimeFigureOut">
               <a:rPr lang="fr-CH" smtClean="0"/>
-              <a:t>23.05.2024</a:t>
+              <a:t>30.05.2024</a:t>
             </a:fld>
             <a:endParaRPr lang="fr-CH"/>
           </a:p>
@@ -1418,7 +1420,7 @@
           <a:p>
             <a:fld id="{46FC2CE2-C47C-4DDC-A391-1FD24B8ADB44}" type="datetimeFigureOut">
               <a:rPr lang="fr-CH" smtClean="0"/>
-              <a:t>23.05.2024</a:t>
+              <a:t>30.05.2024</a:t>
             </a:fld>
             <a:endParaRPr lang="fr-CH"/>
           </a:p>
@@ -1833,7 +1835,7 @@
           <a:p>
             <a:fld id="{46FC2CE2-C47C-4DDC-A391-1FD24B8ADB44}" type="datetimeFigureOut">
               <a:rPr lang="fr-CH" smtClean="0"/>
-              <a:t>23.05.2024</a:t>
+              <a:t>30.05.2024</a:t>
             </a:fld>
             <a:endParaRPr lang="fr-CH"/>
           </a:p>
@@ -1975,7 +1977,7 @@
           <a:p>
             <a:fld id="{46FC2CE2-C47C-4DDC-A391-1FD24B8ADB44}" type="datetimeFigureOut">
               <a:rPr lang="fr-CH" smtClean="0"/>
-              <a:t>23.05.2024</a:t>
+              <a:t>30.05.2024</a:t>
             </a:fld>
             <a:endParaRPr lang="fr-CH"/>
           </a:p>
@@ -2088,7 +2090,7 @@
           <a:p>
             <a:fld id="{46FC2CE2-C47C-4DDC-A391-1FD24B8ADB44}" type="datetimeFigureOut">
               <a:rPr lang="fr-CH" smtClean="0"/>
-              <a:t>23.05.2024</a:t>
+              <a:t>30.05.2024</a:t>
             </a:fld>
             <a:endParaRPr lang="fr-CH"/>
           </a:p>
@@ -2401,7 +2403,7 @@
           <a:p>
             <a:fld id="{46FC2CE2-C47C-4DDC-A391-1FD24B8ADB44}" type="datetimeFigureOut">
               <a:rPr lang="fr-CH" smtClean="0"/>
-              <a:t>23.05.2024</a:t>
+              <a:t>30.05.2024</a:t>
             </a:fld>
             <a:endParaRPr lang="fr-CH"/>
           </a:p>
@@ -2690,7 +2692,7 @@
           <a:p>
             <a:fld id="{46FC2CE2-C47C-4DDC-A391-1FD24B8ADB44}" type="datetimeFigureOut">
               <a:rPr lang="fr-CH" smtClean="0"/>
-              <a:t>23.05.2024</a:t>
+              <a:t>30.05.2024</a:t>
             </a:fld>
             <a:endParaRPr lang="fr-CH"/>
           </a:p>
@@ -2933,7 +2935,7 @@
           <a:p>
             <a:fld id="{46FC2CE2-C47C-4DDC-A391-1FD24B8ADB44}" type="datetimeFigureOut">
               <a:rPr lang="fr-CH" smtClean="0"/>
-              <a:t>23.05.2024</a:t>
+              <a:t>30.05.2024</a:t>
             </a:fld>
             <a:endParaRPr lang="fr-CH"/>
           </a:p>
@@ -3713,10 +3715,9 @@
               <a:t>filter</a:t>
             </a:r>
             <a:r>
-              <a:rPr lang="fr-CH"/>
+              <a:rPr lang="fr-CH" dirty="0"/>
               <a:t> ls</a:t>
             </a:r>
-            <a:endParaRPr lang="fr-CH" dirty="0"/>
           </a:p>
         </p:txBody>
       </p:sp>
@@ -3724,6 +3725,219 @@
     <p:extLst>
       <p:ext uri="{BB962C8B-B14F-4D97-AF65-F5344CB8AC3E}">
         <p14:creationId xmlns:p14="http://schemas.microsoft.com/office/powerpoint/2010/main" val="561360508"/>
+      </p:ext>
+    </p:extLst>
+  </p:cSld>
+  <p:clrMapOvr>
+    <a:masterClrMapping/>
+  </p:clrMapOvr>
+</p:sld>
+</file>
+
+<file path=ppt/slides/slide5.xml><?xml version="1.0" encoding="utf-8"?>
+<p:sld xmlns:a="http://schemas.openxmlformats.org/drawingml/2006/main" xmlns:r="http://schemas.openxmlformats.org/officeDocument/2006/relationships" xmlns:p="http://schemas.openxmlformats.org/presentationml/2006/main">
+  <p:cSld>
+    <p:spTree>
+      <p:nvGrpSpPr>
+        <p:cNvPr id="1" name=""/>
+        <p:cNvGrpSpPr/>
+        <p:nvPr/>
+      </p:nvGrpSpPr>
+      <p:grpSpPr>
+        <a:xfrm>
+          <a:off x="0" y="0"/>
+          <a:ext cx="0" cy="0"/>
+          <a:chOff x="0" y="0"/>
+          <a:chExt cx="0" cy="0"/>
+        </a:xfrm>
+      </p:grpSpPr>
+      <p:sp>
+        <p:nvSpPr>
+          <p:cNvPr id="2" name="Titre 1">
+            <a:extLst>
+              <a:ext uri="{FF2B5EF4-FFF2-40B4-BE49-F238E27FC236}">
+                <a16:creationId xmlns:a16="http://schemas.microsoft.com/office/drawing/2014/main" id="{949DBF03-AEDD-A402-F410-8B48D346C89E}"/>
+              </a:ext>
+            </a:extLst>
+          </p:cNvPr>
+          <p:cNvSpPr>
+            <a:spLocks noGrp="1"/>
+          </p:cNvSpPr>
+          <p:nvPr>
+            <p:ph type="title"/>
+          </p:nvPr>
+        </p:nvSpPr>
+        <p:spPr/>
+        <p:txBody>
+          <a:bodyPr/>
+          <a:lstStyle/>
+          <a:p>
+            <a:r>
+              <a:rPr lang="fr-CH" dirty="0"/>
+              <a:t>Problème de cache local </a:t>
+            </a:r>
+          </a:p>
+        </p:txBody>
+      </p:sp>
+      <p:sp>
+        <p:nvSpPr>
+          <p:cNvPr id="3" name="Espace réservé du contenu 2">
+            <a:extLst>
+              <a:ext uri="{FF2B5EF4-FFF2-40B4-BE49-F238E27FC236}">
+                <a16:creationId xmlns:a16="http://schemas.microsoft.com/office/drawing/2014/main" id="{827415CD-3AC6-703F-700E-1C21DBAF68C4}"/>
+              </a:ext>
+            </a:extLst>
+          </p:cNvPr>
+          <p:cNvSpPr>
+            <a:spLocks noGrp="1"/>
+          </p:cNvSpPr>
+          <p:nvPr>
+            <p:ph idx="1"/>
+          </p:nvPr>
+        </p:nvSpPr>
+        <p:spPr/>
+        <p:txBody>
+          <a:bodyPr/>
+          <a:lstStyle/>
+          <a:p>
+            <a:r>
+              <a:rPr lang="fr-CH" dirty="0">
+                <a:hlinkClick r:id="rId2"/>
+              </a:rPr>
+              <a:t>https://stackoverflow.com/questions/24416541/firebase-persistence-clear-firebase-cache</a:t>
+            </a:r>
+            <a:endParaRPr lang="fr-CH" dirty="0"/>
+          </a:p>
+          <a:p>
+            <a:endParaRPr lang="fr-CH" dirty="0"/>
+          </a:p>
+        </p:txBody>
+      </p:sp>
+      <p:pic>
+        <p:nvPicPr>
+          <p:cNvPr id="5" name="Image 4">
+            <a:extLst>
+              <a:ext uri="{FF2B5EF4-FFF2-40B4-BE49-F238E27FC236}">
+                <a16:creationId xmlns:a16="http://schemas.microsoft.com/office/drawing/2014/main" id="{5249FC3E-8A5E-982C-F418-E339294937FA}"/>
+              </a:ext>
+            </a:extLst>
+          </p:cNvPr>
+          <p:cNvPicPr>
+            <a:picLocks noChangeAspect="1"/>
+          </p:cNvPicPr>
+          <p:nvPr/>
+        </p:nvPicPr>
+        <p:blipFill>
+          <a:blip r:embed="rId3"/>
+          <a:stretch>
+            <a:fillRect/>
+          </a:stretch>
+        </p:blipFill>
+        <p:spPr>
+          <a:xfrm>
+            <a:off x="1089293" y="2752248"/>
+            <a:ext cx="5258534" cy="685896"/>
+          </a:xfrm>
+          <a:prstGeom prst="rect">
+            <a:avLst/>
+          </a:prstGeom>
+        </p:spPr>
+      </p:pic>
+    </p:spTree>
+    <p:extLst>
+      <p:ext uri="{BB962C8B-B14F-4D97-AF65-F5344CB8AC3E}">
+        <p14:creationId xmlns:p14="http://schemas.microsoft.com/office/powerpoint/2010/main" val="1844493845"/>
+      </p:ext>
+    </p:extLst>
+  </p:cSld>
+  <p:clrMapOvr>
+    <a:masterClrMapping/>
+  </p:clrMapOvr>
+</p:sld>
+</file>
+
+<file path=ppt/slides/slide6.xml><?xml version="1.0" encoding="utf-8"?>
+<p:sld xmlns:a="http://schemas.openxmlformats.org/drawingml/2006/main" xmlns:r="http://schemas.openxmlformats.org/officeDocument/2006/relationships" xmlns:p="http://schemas.openxmlformats.org/presentationml/2006/main">
+  <p:cSld>
+    <p:spTree>
+      <p:nvGrpSpPr>
+        <p:cNvPr id="1" name=""/>
+        <p:cNvGrpSpPr/>
+        <p:nvPr/>
+      </p:nvGrpSpPr>
+      <p:grpSpPr>
+        <a:xfrm>
+          <a:off x="0" y="0"/>
+          <a:ext cx="0" cy="0"/>
+          <a:chOff x="0" y="0"/>
+          <a:chExt cx="0" cy="0"/>
+        </a:xfrm>
+      </p:grpSpPr>
+      <p:sp>
+        <p:nvSpPr>
+          <p:cNvPr id="2" name="Titre 1">
+            <a:extLst>
+              <a:ext uri="{FF2B5EF4-FFF2-40B4-BE49-F238E27FC236}">
+                <a16:creationId xmlns:a16="http://schemas.microsoft.com/office/drawing/2014/main" id="{DFCD8D15-7D4E-2098-FC11-5B3E90606F26}"/>
+              </a:ext>
+            </a:extLst>
+          </p:cNvPr>
+          <p:cNvSpPr>
+            <a:spLocks noGrp="1"/>
+          </p:cNvSpPr>
+          <p:nvPr>
+            <p:ph type="title"/>
+          </p:nvPr>
+        </p:nvSpPr>
+        <p:spPr/>
+        <p:txBody>
+          <a:bodyPr/>
+          <a:lstStyle/>
+          <a:p>
+            <a:endParaRPr lang="fr-CH" dirty="0"/>
+          </a:p>
+        </p:txBody>
+      </p:sp>
+      <p:sp>
+        <p:nvSpPr>
+          <p:cNvPr id="3" name="Espace réservé du contenu 2">
+            <a:extLst>
+              <a:ext uri="{FF2B5EF4-FFF2-40B4-BE49-F238E27FC236}">
+                <a16:creationId xmlns:a16="http://schemas.microsoft.com/office/drawing/2014/main" id="{36105926-72F4-EE20-B875-F41A9CF9C228}"/>
+              </a:ext>
+            </a:extLst>
+          </p:cNvPr>
+          <p:cNvSpPr>
+            <a:spLocks noGrp="1"/>
+          </p:cNvSpPr>
+          <p:nvPr>
+            <p:ph idx="1"/>
+          </p:nvPr>
+        </p:nvSpPr>
+        <p:spPr/>
+        <p:txBody>
+          <a:bodyPr/>
+          <a:lstStyle/>
+          <a:p>
+            <a:r>
+              <a:rPr lang="fr-CH" dirty="0"/>
+              <a:t>Pas de versioning des </a:t>
+            </a:r>
+            <a:r>
+              <a:rPr lang="fr-CH" dirty="0" err="1"/>
+              <a:t>schema</a:t>
+            </a:r>
+            <a:r>
+              <a:rPr lang="fr-CH" dirty="0"/>
+              <a:t> : comment gérer sur le long terme ?</a:t>
+            </a:r>
+          </a:p>
+        </p:txBody>
+      </p:sp>
+    </p:spTree>
+    <p:extLst>
+      <p:ext uri="{BB962C8B-B14F-4D97-AF65-F5344CB8AC3E}">
+        <p14:creationId xmlns:p14="http://schemas.microsoft.com/office/powerpoint/2010/main" val="3715087427"/>
       </p:ext>
     </p:extLst>
   </p:cSld>

</xml_diff>

<commit_message>
refactor + fix bug
</commit_message>
<xml_diff>
--- a/5_Project/Présentation.pptx
+++ b/5_Project/Présentation.pptx
@@ -5,12 +5,10 @@
     <p:sldMasterId id="2147483648" r:id="rId1"/>
   </p:sldMasterIdLst>
   <p:sldIdLst>
-    <p:sldId id="256" r:id="rId2"/>
-    <p:sldId id="257" r:id="rId3"/>
-    <p:sldId id="258" r:id="rId4"/>
-    <p:sldId id="259" r:id="rId5"/>
-    <p:sldId id="260" r:id="rId6"/>
-    <p:sldId id="261" r:id="rId7"/>
+    <p:sldId id="258" r:id="rId2"/>
+    <p:sldId id="259" r:id="rId3"/>
+    <p:sldId id="260" r:id="rId4"/>
+    <p:sldId id="261" r:id="rId5"/>
   </p:sldIdLst>
   <p:sldSz cx="12192000" cy="6858000"/>
   <p:notesSz cx="6858000" cy="9144000"/>
@@ -266,7 +264,7 @@
           <a:p>
             <a:fld id="{46FC2CE2-C47C-4DDC-A391-1FD24B8ADB44}" type="datetimeFigureOut">
               <a:rPr lang="fr-CH" smtClean="0"/>
-              <a:t>30.05.2024</a:t>
+              <a:t>06.06.2024</a:t>
             </a:fld>
             <a:endParaRPr lang="fr-CH"/>
           </a:p>
@@ -466,7 +464,7 @@
           <a:p>
             <a:fld id="{46FC2CE2-C47C-4DDC-A391-1FD24B8ADB44}" type="datetimeFigureOut">
               <a:rPr lang="fr-CH" smtClean="0"/>
-              <a:t>30.05.2024</a:t>
+              <a:t>06.06.2024</a:t>
             </a:fld>
             <a:endParaRPr lang="fr-CH"/>
           </a:p>
@@ -676,7 +674,7 @@
           <a:p>
             <a:fld id="{46FC2CE2-C47C-4DDC-A391-1FD24B8ADB44}" type="datetimeFigureOut">
               <a:rPr lang="fr-CH" smtClean="0"/>
-              <a:t>30.05.2024</a:t>
+              <a:t>06.06.2024</a:t>
             </a:fld>
             <a:endParaRPr lang="fr-CH"/>
           </a:p>
@@ -876,7 +874,7 @@
           <a:p>
             <a:fld id="{46FC2CE2-C47C-4DDC-A391-1FD24B8ADB44}" type="datetimeFigureOut">
               <a:rPr lang="fr-CH" smtClean="0"/>
-              <a:t>30.05.2024</a:t>
+              <a:t>06.06.2024</a:t>
             </a:fld>
             <a:endParaRPr lang="fr-CH"/>
           </a:p>
@@ -1152,7 +1150,7 @@
           <a:p>
             <a:fld id="{46FC2CE2-C47C-4DDC-A391-1FD24B8ADB44}" type="datetimeFigureOut">
               <a:rPr lang="fr-CH" smtClean="0"/>
-              <a:t>30.05.2024</a:t>
+              <a:t>06.06.2024</a:t>
             </a:fld>
             <a:endParaRPr lang="fr-CH"/>
           </a:p>
@@ -1420,7 +1418,7 @@
           <a:p>
             <a:fld id="{46FC2CE2-C47C-4DDC-A391-1FD24B8ADB44}" type="datetimeFigureOut">
               <a:rPr lang="fr-CH" smtClean="0"/>
-              <a:t>30.05.2024</a:t>
+              <a:t>06.06.2024</a:t>
             </a:fld>
             <a:endParaRPr lang="fr-CH"/>
           </a:p>
@@ -1835,7 +1833,7 @@
           <a:p>
             <a:fld id="{46FC2CE2-C47C-4DDC-A391-1FD24B8ADB44}" type="datetimeFigureOut">
               <a:rPr lang="fr-CH" smtClean="0"/>
-              <a:t>30.05.2024</a:t>
+              <a:t>06.06.2024</a:t>
             </a:fld>
             <a:endParaRPr lang="fr-CH"/>
           </a:p>
@@ -1977,7 +1975,7 @@
           <a:p>
             <a:fld id="{46FC2CE2-C47C-4DDC-A391-1FD24B8ADB44}" type="datetimeFigureOut">
               <a:rPr lang="fr-CH" smtClean="0"/>
-              <a:t>30.05.2024</a:t>
+              <a:t>06.06.2024</a:t>
             </a:fld>
             <a:endParaRPr lang="fr-CH"/>
           </a:p>
@@ -2090,7 +2088,7 @@
           <a:p>
             <a:fld id="{46FC2CE2-C47C-4DDC-A391-1FD24B8ADB44}" type="datetimeFigureOut">
               <a:rPr lang="fr-CH" smtClean="0"/>
-              <a:t>30.05.2024</a:t>
+              <a:t>06.06.2024</a:t>
             </a:fld>
             <a:endParaRPr lang="fr-CH"/>
           </a:p>
@@ -2403,7 +2401,7 @@
           <a:p>
             <a:fld id="{46FC2CE2-C47C-4DDC-A391-1FD24B8ADB44}" type="datetimeFigureOut">
               <a:rPr lang="fr-CH" smtClean="0"/>
-              <a:t>30.05.2024</a:t>
+              <a:t>06.06.2024</a:t>
             </a:fld>
             <a:endParaRPr lang="fr-CH"/>
           </a:p>
@@ -2692,7 +2690,7 @@
           <a:p>
             <a:fld id="{46FC2CE2-C47C-4DDC-A391-1FD24B8ADB44}" type="datetimeFigureOut">
               <a:rPr lang="fr-CH" smtClean="0"/>
-              <a:t>30.05.2024</a:t>
+              <a:t>06.06.2024</a:t>
             </a:fld>
             <a:endParaRPr lang="fr-CH"/>
           </a:p>
@@ -2935,7 +2933,7 @@
           <a:p>
             <a:fld id="{46FC2CE2-C47C-4DDC-A391-1FD24B8ADB44}" type="datetimeFigureOut">
               <a:rPr lang="fr-CH" smtClean="0"/>
-              <a:t>30.05.2024</a:t>
+              <a:t>06.06.2024</a:t>
             </a:fld>
             <a:endParaRPr lang="fr-CH"/>
           </a:p>
@@ -3357,223 +3355,6 @@
           <p:cNvPr id="2" name="Titre 1">
             <a:extLst>
               <a:ext uri="{FF2B5EF4-FFF2-40B4-BE49-F238E27FC236}">
-                <a16:creationId xmlns:a16="http://schemas.microsoft.com/office/drawing/2014/main" id="{0A9B2CD5-DF15-7349-9F6F-59A063641266}"/>
-              </a:ext>
-            </a:extLst>
-          </p:cNvPr>
-          <p:cNvSpPr>
-            <a:spLocks noGrp="1"/>
-          </p:cNvSpPr>
-          <p:nvPr>
-            <p:ph type="ctrTitle"/>
-          </p:nvPr>
-        </p:nvSpPr>
-        <p:spPr/>
-        <p:txBody>
-          <a:bodyPr/>
-          <a:lstStyle/>
-          <a:p>
-            <a:endParaRPr lang="fr-CH" dirty="0"/>
-          </a:p>
-        </p:txBody>
-      </p:sp>
-      <p:sp>
-        <p:nvSpPr>
-          <p:cNvPr id="3" name="Sous-titre 2">
-            <a:extLst>
-              <a:ext uri="{FF2B5EF4-FFF2-40B4-BE49-F238E27FC236}">
-                <a16:creationId xmlns:a16="http://schemas.microsoft.com/office/drawing/2014/main" id="{2DC727A4-99EC-22AE-2C55-6F5A51BD50A2}"/>
-              </a:ext>
-            </a:extLst>
-          </p:cNvPr>
-          <p:cNvSpPr>
-            <a:spLocks noGrp="1"/>
-          </p:cNvSpPr>
-          <p:nvPr>
-            <p:ph type="subTitle" idx="1"/>
-          </p:nvPr>
-        </p:nvSpPr>
-        <p:spPr/>
-        <p:txBody>
-          <a:bodyPr/>
-          <a:lstStyle/>
-          <a:p>
-            <a:endParaRPr lang="fr-CH"/>
-          </a:p>
-        </p:txBody>
-      </p:sp>
-      <p:pic>
-        <p:nvPicPr>
-          <p:cNvPr id="5" name="Image 4">
-            <a:extLst>
-              <a:ext uri="{FF2B5EF4-FFF2-40B4-BE49-F238E27FC236}">
-                <a16:creationId xmlns:a16="http://schemas.microsoft.com/office/drawing/2014/main" id="{E434ECF4-85AC-21B0-4799-F83CE70DBC91}"/>
-              </a:ext>
-            </a:extLst>
-          </p:cNvPr>
-          <p:cNvPicPr>
-            <a:picLocks noChangeAspect="1"/>
-          </p:cNvPicPr>
-          <p:nvPr/>
-        </p:nvPicPr>
-        <p:blipFill>
-          <a:blip r:embed="rId2"/>
-          <a:stretch>
-            <a:fillRect/>
-          </a:stretch>
-        </p:blipFill>
-        <p:spPr>
-          <a:xfrm>
-            <a:off x="659780" y="0"/>
-            <a:ext cx="10872439" cy="6858000"/>
-          </a:xfrm>
-          <a:prstGeom prst="rect">
-            <a:avLst/>
-          </a:prstGeom>
-        </p:spPr>
-      </p:pic>
-    </p:spTree>
-    <p:extLst>
-      <p:ext uri="{BB962C8B-B14F-4D97-AF65-F5344CB8AC3E}">
-        <p14:creationId xmlns:p14="http://schemas.microsoft.com/office/powerpoint/2010/main" val="333279306"/>
-      </p:ext>
-    </p:extLst>
-  </p:cSld>
-  <p:clrMapOvr>
-    <a:masterClrMapping/>
-  </p:clrMapOvr>
-</p:sld>
-</file>
-
-<file path=ppt/slides/slide2.xml><?xml version="1.0" encoding="utf-8"?>
-<p:sld xmlns:a="http://schemas.openxmlformats.org/drawingml/2006/main" xmlns:r="http://schemas.openxmlformats.org/officeDocument/2006/relationships" xmlns:p="http://schemas.openxmlformats.org/presentationml/2006/main">
-  <p:cSld>
-    <p:spTree>
-      <p:nvGrpSpPr>
-        <p:cNvPr id="1" name=""/>
-        <p:cNvGrpSpPr/>
-        <p:nvPr/>
-      </p:nvGrpSpPr>
-      <p:grpSpPr>
-        <a:xfrm>
-          <a:off x="0" y="0"/>
-          <a:ext cx="0" cy="0"/>
-          <a:chOff x="0" y="0"/>
-          <a:chExt cx="0" cy="0"/>
-        </a:xfrm>
-      </p:grpSpPr>
-      <p:sp>
-        <p:nvSpPr>
-          <p:cNvPr id="2" name="Titre 1">
-            <a:extLst>
-              <a:ext uri="{FF2B5EF4-FFF2-40B4-BE49-F238E27FC236}">
-                <a16:creationId xmlns:a16="http://schemas.microsoft.com/office/drawing/2014/main" id="{E49ACBC2-D893-7DF0-3D7D-2DE0D9C8D300}"/>
-              </a:ext>
-            </a:extLst>
-          </p:cNvPr>
-          <p:cNvSpPr>
-            <a:spLocks noGrp="1"/>
-          </p:cNvSpPr>
-          <p:nvPr>
-            <p:ph type="title"/>
-          </p:nvPr>
-        </p:nvSpPr>
-        <p:spPr/>
-        <p:txBody>
-          <a:bodyPr/>
-          <a:lstStyle/>
-          <a:p>
-            <a:endParaRPr lang="fr-CH"/>
-          </a:p>
-        </p:txBody>
-      </p:sp>
-      <p:sp>
-        <p:nvSpPr>
-          <p:cNvPr id="3" name="Espace réservé du contenu 2">
-            <a:extLst>
-              <a:ext uri="{FF2B5EF4-FFF2-40B4-BE49-F238E27FC236}">
-                <a16:creationId xmlns:a16="http://schemas.microsoft.com/office/drawing/2014/main" id="{A801459B-FEE6-33F6-8CAD-DCD91AC7201A}"/>
-              </a:ext>
-            </a:extLst>
-          </p:cNvPr>
-          <p:cNvSpPr>
-            <a:spLocks noGrp="1"/>
-          </p:cNvSpPr>
-          <p:nvPr>
-            <p:ph idx="1"/>
-          </p:nvPr>
-        </p:nvSpPr>
-        <p:spPr/>
-        <p:txBody>
-          <a:bodyPr/>
-          <a:lstStyle/>
-          <a:p>
-            <a:r>
-              <a:rPr lang="fr-FR" dirty="0"/>
-              <a:t>Configurer : Créer une app dans </a:t>
-            </a:r>
-            <a:r>
-              <a:rPr lang="fr-FR" dirty="0" err="1"/>
-              <a:t>Firebase</a:t>
-            </a:r>
-            <a:r>
-              <a:rPr lang="fr-FR" dirty="0"/>
-              <a:t>, ajouter google-</a:t>
-            </a:r>
-            <a:r>
-              <a:rPr lang="fr-FR" dirty="0" err="1"/>
-              <a:t>services.json</a:t>
-            </a:r>
-            <a:r>
-              <a:rPr lang="fr-FR" dirty="0"/>
-              <a:t>, ajouter les dépendances</a:t>
-            </a:r>
-          </a:p>
-          <a:p>
-            <a:pPr lvl="1"/>
-            <a:r>
-              <a:rPr lang="fr-FR" dirty="0"/>
-              <a:t>Requiert google-services</a:t>
-            </a:r>
-            <a:endParaRPr lang="fr-CH" dirty="0"/>
-          </a:p>
-        </p:txBody>
-      </p:sp>
-    </p:spTree>
-    <p:extLst>
-      <p:ext uri="{BB962C8B-B14F-4D97-AF65-F5344CB8AC3E}">
-        <p14:creationId xmlns:p14="http://schemas.microsoft.com/office/powerpoint/2010/main" val="3979845930"/>
-      </p:ext>
-    </p:extLst>
-  </p:cSld>
-  <p:clrMapOvr>
-    <a:masterClrMapping/>
-  </p:clrMapOvr>
-</p:sld>
-</file>
-
-<file path=ppt/slides/slide3.xml><?xml version="1.0" encoding="utf-8"?>
-<p:sld xmlns:a="http://schemas.openxmlformats.org/drawingml/2006/main" xmlns:r="http://schemas.openxmlformats.org/officeDocument/2006/relationships" xmlns:p="http://schemas.openxmlformats.org/presentationml/2006/main">
-  <p:cSld>
-    <p:spTree>
-      <p:nvGrpSpPr>
-        <p:cNvPr id="1" name=""/>
-        <p:cNvGrpSpPr/>
-        <p:nvPr/>
-      </p:nvGrpSpPr>
-      <p:grpSpPr>
-        <a:xfrm>
-          <a:off x="0" y="0"/>
-          <a:ext cx="0" cy="0"/>
-          <a:chOff x="0" y="0"/>
-          <a:chExt cx="0" cy="0"/>
-        </a:xfrm>
-      </p:grpSpPr>
-      <p:sp>
-        <p:nvSpPr>
-          <p:cNvPr id="2" name="Titre 1">
-            <a:extLst>
-              <a:ext uri="{FF2B5EF4-FFF2-40B4-BE49-F238E27FC236}">
                 <a16:creationId xmlns:a16="http://schemas.microsoft.com/office/drawing/2014/main" id="{9AF3F7D9-F5AD-F29D-CF37-0B395AE16DB0}"/>
               </a:ext>
             </a:extLst>
@@ -3636,7 +3417,7 @@
 </p:sld>
 </file>
 
-<file path=ppt/slides/slide4.xml><?xml version="1.0" encoding="utf-8"?>
+<file path=ppt/slides/slide2.xml><?xml version="1.0" encoding="utf-8"?>
 <p:sld xmlns:a="http://schemas.openxmlformats.org/drawingml/2006/main" xmlns:r="http://schemas.openxmlformats.org/officeDocument/2006/relationships" xmlns:p="http://schemas.openxmlformats.org/presentationml/2006/main">
   <p:cSld>
     <p:spTree>
@@ -3701,6 +3482,12 @@
           <a:p>
             <a:r>
               <a:rPr lang="fr-CH" dirty="0"/>
+              <a:t>Très simple</a:t>
+            </a:r>
+          </a:p>
+          <a:p>
+            <a:r>
+              <a:rPr lang="fr-CH" dirty="0"/>
               <a:t>Possibilité de faire des tris / limiter le nombre de données</a:t>
             </a:r>
           </a:p>
@@ -3708,16 +3495,59 @@
             <a:pPr lvl="1"/>
             <a:r>
               <a:rPr lang="fr-CH" dirty="0"/>
-              <a:t>Limité : pas moyen de </a:t>
+              <a:t>Limité : pas de projection (</a:t>
+            </a:r>
+            <a:r>
+              <a:rPr lang="fr-CH" i="1" dirty="0"/>
+              <a:t>select</a:t>
+            </a:r>
+            <a:r>
+              <a:rPr lang="fr-CH" dirty="0"/>
+              <a:t>)</a:t>
+            </a:r>
+          </a:p>
+          <a:p>
+            <a:r>
+              <a:rPr lang="fr-CH" dirty="0"/>
+              <a:t>Synchronisation automatique</a:t>
+            </a:r>
+          </a:p>
+          <a:p>
+            <a:pPr lvl="1"/>
+            <a:r>
+              <a:rPr lang="fr-CH" i="1" dirty="0"/>
+              <a:t>push()</a:t>
+            </a:r>
+            <a:r>
+              <a:rPr lang="fr-CH" dirty="0"/>
+              <a:t> : estimation du temps du serveur et création d’un ID </a:t>
             </a:r>
             <a:r>
               <a:rPr lang="fr-CH" dirty="0" err="1"/>
-              <a:t>filter</a:t>
-            </a:r>
+              <a:t>triable</a:t>
+            </a:r>
+            <a:endParaRPr lang="fr-CH" i="1" dirty="0"/>
+          </a:p>
+          <a:p>
             <a:r>
               <a:rPr lang="fr-CH" dirty="0"/>
-              <a:t> ls</a:t>
-            </a:r>
+              <a:t>Indexage</a:t>
+            </a:r>
+          </a:p>
+          <a:p>
+            <a:r>
+              <a:rPr lang="fr-CH" dirty="0"/>
+              <a:t>Intégration avec d’autres services </a:t>
+            </a:r>
+            <a:r>
+              <a:rPr lang="fr-CH" dirty="0" err="1"/>
+              <a:t>Firebase</a:t>
+            </a:r>
+            <a:endParaRPr lang="fr-CH" dirty="0"/>
+          </a:p>
+          <a:p>
+            <a:pPr lvl="1"/>
+            <a:endParaRPr lang="fr-CH" dirty="0"/>
           </a:p>
         </p:txBody>
       </p:sp>
@@ -3734,7 +3564,7 @@
 </p:sld>
 </file>
 
-<file path=ppt/slides/slide5.xml><?xml version="1.0" encoding="utf-8"?>
+<file path=ppt/slides/slide3.xml><?xml version="1.0" encoding="utf-8"?>
 <p:sld xmlns:a="http://schemas.openxmlformats.org/drawingml/2006/main" xmlns:r="http://schemas.openxmlformats.org/officeDocument/2006/relationships" xmlns:p="http://schemas.openxmlformats.org/presentationml/2006/main">
   <p:cSld>
     <p:spTree>
@@ -3856,7 +3686,7 @@
 </p:sld>
 </file>
 
-<file path=ppt/slides/slide6.xml><?xml version="1.0" encoding="utf-8"?>
+<file path=ppt/slides/slide4.xml><?xml version="1.0" encoding="utf-8"?>
 <p:sld xmlns:a="http://schemas.openxmlformats.org/drawingml/2006/main" xmlns:r="http://schemas.openxmlformats.org/officeDocument/2006/relationships" xmlns:p="http://schemas.openxmlformats.org/presentationml/2006/main">
   <p:cSld>
     <p:spTree>
@@ -3930,6 +3760,60 @@
             <a:r>
               <a:rPr lang="fr-CH" dirty="0"/>
               <a:t> : comment gérer sur le long terme ?</a:t>
+            </a:r>
+          </a:p>
+          <a:p>
+            <a:pPr lvl="1"/>
+            <a:r>
+              <a:rPr lang="fr-CH" dirty="0"/>
+              <a:t>Pas de possibilité simple pour effacer le cache local </a:t>
+            </a:r>
+          </a:p>
+          <a:p>
+            <a:pPr lvl="1"/>
+            <a:r>
+              <a:rPr lang="fr-CH" dirty="0"/>
+              <a:t>Conflit de schémas …</a:t>
+            </a:r>
+          </a:p>
+          <a:p>
+            <a:r>
+              <a:rPr lang="fr-CH" dirty="0"/>
+              <a:t>En cas de suppression, tout l’objet est renvoyé</a:t>
+            </a:r>
+          </a:p>
+          <a:p>
+            <a:pPr lvl="1"/>
+            <a:r>
+              <a:rPr lang="fr-CH" dirty="0"/>
+              <a:t>Vie privée ?	</a:t>
+            </a:r>
+          </a:p>
+          <a:p>
+            <a:r>
+              <a:rPr lang="fr-CH" dirty="0"/>
+              <a:t>Logique dans du JSON</a:t>
+            </a:r>
+          </a:p>
+          <a:p>
+            <a:pPr lvl="1"/>
+            <a:r>
+              <a:rPr lang="fr-CH" dirty="0"/>
+              <a:t>Pas agréable à lire / écrire</a:t>
+            </a:r>
+          </a:p>
+          <a:p>
+            <a:pPr lvl="1"/>
+            <a:r>
+              <a:rPr lang="fr-CH" dirty="0"/>
+              <a:t>Pas possible de factoriser les règles</a:t>
+            </a:r>
+          </a:p>
+          <a:p>
+            <a:pPr lvl="1"/>
+            <a:r>
+              <a:rPr lang="fr-CH" dirty="0"/>
+              <a:t>«Ecriture / Lecture» seulement ; pas de suppression</a:t>
             </a:r>
           </a:p>
         </p:txBody>

</xml_diff>